<commit_message>
update review and unit 11 test
</commit_message>
<xml_diff>
--- a/_PowerPoints/2nd Semester/Unit 11 Calc Preview/PreCalc_Day_076 Review.pptx
+++ b/_PowerPoints/2nd Semester/Unit 11 Calc Preview/PreCalc_Day_076 Review.pptx
@@ -6,9 +6,10 @@
   </p:sldMasterIdLst>
   <p:sldIdLst>
     <p:sldId id="256" r:id="rId2"/>
-    <p:sldId id="303" r:id="rId3"/>
-    <p:sldId id="304" r:id="rId4"/>
-    <p:sldId id="305" r:id="rId5"/>
+    <p:sldId id="306" r:id="rId3"/>
+    <p:sldId id="303" r:id="rId4"/>
+    <p:sldId id="304" r:id="rId5"/>
+    <p:sldId id="305" r:id="rId6"/>
   </p:sldIdLst>
   <p:sldSz cx="12192000" cy="6858000"/>
   <p:notesSz cx="6858000" cy="9144000"/>
@@ -285,7 +286,7 @@
             <a:fld id="{87DE6118-2437-4B30-8E3C-4D2BE6020583}" type="datetimeFigureOut">
               <a:rPr lang="en-US" dirty="0"/>
               <a:pPr/>
-              <a:t>4/27/2018</a:t>
+              <a:t>5/3/2018</a:t>
             </a:fld>
             <a:endParaRPr lang="en-US" dirty="0"/>
           </a:p>
@@ -611,7 +612,7 @@
           <a:p>
             <a:fld id="{87DE6118-2437-4B30-8E3C-4D2BE6020583}" type="datetimeFigureOut">
               <a:rPr lang="en-US" dirty="0"/>
-              <a:t>4/27/2018</a:t>
+              <a:t>5/3/2018</a:t>
             </a:fld>
             <a:endParaRPr lang="en-US" dirty="0"/>
           </a:p>
@@ -786,7 +787,7 @@
           <a:p>
             <a:fld id="{87DE6118-2437-4B30-8E3C-4D2BE6020583}" type="datetimeFigureOut">
               <a:rPr lang="en-US" dirty="0"/>
-              <a:t>4/27/2018</a:t>
+              <a:t>5/3/2018</a:t>
             </a:fld>
             <a:endParaRPr lang="en-US" dirty="0"/>
           </a:p>
@@ -951,7 +952,7 @@
           <a:p>
             <a:fld id="{87DE6118-2437-4B30-8E3C-4D2BE6020583}" type="datetimeFigureOut">
               <a:rPr lang="en-US" dirty="0"/>
-              <a:t>4/27/2018</a:t>
+              <a:t>5/3/2018</a:t>
             </a:fld>
             <a:endParaRPr lang="en-US" dirty="0"/>
           </a:p>
@@ -1224,7 +1225,7 @@
             <a:fld id="{87DE6118-2437-4B30-8E3C-4D2BE6020583}" type="datetimeFigureOut">
               <a:rPr lang="en-US" dirty="0"/>
               <a:pPr/>
-              <a:t>4/27/2018</a:t>
+              <a:t>5/3/2018</a:t>
             </a:fld>
             <a:endParaRPr lang="en-US" dirty="0"/>
           </a:p>
@@ -1614,7 +1615,7 @@
           <a:p>
             <a:fld id="{87DE6118-2437-4B30-8E3C-4D2BE6020583}" type="datetimeFigureOut">
               <a:rPr lang="en-US" dirty="0"/>
-              <a:t>4/27/2018</a:t>
+              <a:t>5/3/2018</a:t>
             </a:fld>
             <a:endParaRPr lang="en-US" dirty="0"/>
           </a:p>
@@ -2086,7 +2087,7 @@
           <a:p>
             <a:fld id="{87DE6118-2437-4B30-8E3C-4D2BE6020583}" type="datetimeFigureOut">
               <a:rPr lang="en-US" dirty="0"/>
-              <a:t>4/27/2018</a:t>
+              <a:t>5/3/2018</a:t>
             </a:fld>
             <a:endParaRPr lang="en-US" dirty="0"/>
           </a:p>
@@ -2199,7 +2200,7 @@
           <a:p>
             <a:fld id="{87DE6118-2437-4B30-8E3C-4D2BE6020583}" type="datetimeFigureOut">
               <a:rPr lang="en-US" dirty="0"/>
-              <a:t>4/27/2018</a:t>
+              <a:t>5/3/2018</a:t>
             </a:fld>
             <a:endParaRPr lang="en-US" dirty="0"/>
           </a:p>
@@ -2289,7 +2290,7 @@
           <a:p>
             <a:fld id="{87DE6118-2437-4B30-8E3C-4D2BE6020583}" type="datetimeFigureOut">
               <a:rPr lang="en-US" dirty="0"/>
-              <a:t>4/27/2018</a:t>
+              <a:t>5/3/2018</a:t>
             </a:fld>
             <a:endParaRPr lang="en-US" dirty="0"/>
           </a:p>
@@ -2631,7 +2632,7 @@
             <a:fld id="{87DE6118-2437-4B30-8E3C-4D2BE6020583}" type="datetimeFigureOut">
               <a:rPr lang="en-US" dirty="0"/>
               <a:pPr/>
-              <a:t>4/27/2018</a:t>
+              <a:t>5/3/2018</a:t>
             </a:fld>
             <a:endParaRPr lang="en-US" dirty="0"/>
           </a:p>
@@ -3016,7 +3017,7 @@
             <a:fld id="{87DE6118-2437-4B30-8E3C-4D2BE6020583}" type="datetimeFigureOut">
               <a:rPr lang="en-US" dirty="0"/>
               <a:pPr/>
-              <a:t>4/27/2018</a:t>
+              <a:t>5/3/2018</a:t>
             </a:fld>
             <a:endParaRPr lang="en-US" dirty="0"/>
           </a:p>
@@ -3291,7 +3292,7 @@
             <a:fld id="{87DE6118-2437-4B30-8E3C-4D2BE6020583}" type="datetimeFigureOut">
               <a:rPr lang="en-US" dirty="0"/>
               <a:pPr/>
-              <a:t>4/27/2018</a:t>
+              <a:t>5/3/2018</a:t>
             </a:fld>
             <a:endParaRPr lang="en-US" dirty="0"/>
           </a:p>
@@ -3847,11 +3848,7 @@
           <a:p>
             <a:r>
               <a:rPr lang="en-US" dirty="0" smtClean="0"/>
-              <a:t>Day </a:t>
-            </a:r>
-            <a:r>
-              <a:rPr lang="en-US" dirty="0" smtClean="0"/>
-              <a:t>76</a:t>
+              <a:t>Day 76</a:t>
             </a:r>
             <a:endParaRPr lang="en-US" dirty="0"/>
           </a:p>
@@ -3911,15 +3908,7 @@
           <a:p>
             <a:r>
               <a:rPr lang="en-US" dirty="0" smtClean="0"/>
-              <a:t>For </a:t>
-            </a:r>
-            <a:r>
-              <a:rPr lang="en-US" dirty="0" smtClean="0"/>
-              <a:t>Last Time</a:t>
-            </a:r>
-            <a:r>
-              <a:rPr lang="en-US" dirty="0" smtClean="0"/>
-              <a:t>... </a:t>
+              <a:t>Bell Work</a:t>
             </a:r>
             <a:endParaRPr lang="en-US" dirty="0"/>
           </a:p>
@@ -3927,6 +3916,349 @@
       </p:sp>
       <mc:AlternateContent xmlns:mc="http://schemas.openxmlformats.org/markup-compatibility/2006">
         <mc:Choice xmlns:a14="http://schemas.microsoft.com/office/drawing/2010/main" Requires="a14">
+          <p:sp>
+            <p:nvSpPr>
+              <p:cNvPr id="3" name="Content Placeholder 2"/>
+              <p:cNvSpPr>
+                <a:spLocks noGrp="1"/>
+              </p:cNvSpPr>
+              <p:nvPr>
+                <p:ph idx="1"/>
+              </p:nvPr>
+            </p:nvSpPr>
+            <p:spPr>
+              <a:xfrm>
+                <a:off x="1371600" y="1436914"/>
+                <a:ext cx="9601200" cy="5297714"/>
+              </a:xfrm>
+            </p:spPr>
+            <p:txBody>
+              <a:bodyPr>
+                <a:normAutofit fontScale="92500" lnSpcReduction="20000"/>
+              </a:bodyPr>
+              <a:lstStyle/>
+              <a:p>
+                <a:pPr marL="0" indent="0">
+                  <a:buNone/>
+                </a:pPr>
+                <a:r>
+                  <a:rPr lang="en-US" sz="4000" i="1" dirty="0" smtClean="0">
+                    <a:latin typeface="Cambria Math" panose="02040503050406030204" pitchFamily="18" charset="0"/>
+                  </a:rPr>
+                  <a:t>Evaluate</a:t>
+                </a:r>
+              </a:p>
+              <a:p>
+                <a:pPr marL="0" indent="0">
+                  <a:buNone/>
+                </a:pPr>
+                <a14:m>
+                  <m:oMathPara xmlns:m="http://schemas.openxmlformats.org/officeDocument/2006/math">
+                    <m:oMathParaPr>
+                      <m:jc m:val="left"/>
+                    </m:oMathParaPr>
+                    <m:oMath xmlns:m="http://schemas.openxmlformats.org/officeDocument/2006/math">
+                      <m:nary>
+                        <m:naryPr>
+                          <m:chr m:val="∑"/>
+                          <m:ctrlPr>
+                            <a:rPr lang="en-US" sz="4000" i="1" smtClean="0">
+                              <a:latin typeface="Cambria Math" panose="02040503050406030204" pitchFamily="18" charset="0"/>
+                            </a:rPr>
+                          </m:ctrlPr>
+                        </m:naryPr>
+                        <m:sub>
+                          <m:r>
+                            <m:rPr>
+                              <m:brk m:alnAt="23"/>
+                            </m:rPr>
+                            <a:rPr lang="en-US" sz="4000" i="1">
+                              <a:latin typeface="Cambria Math" panose="02040503050406030204" pitchFamily="18" charset="0"/>
+                            </a:rPr>
+                            <m:t>𝑖</m:t>
+                          </m:r>
+                          <m:r>
+                            <a:rPr lang="en-US" sz="4000" i="1">
+                              <a:latin typeface="Cambria Math" panose="02040503050406030204" pitchFamily="18" charset="0"/>
+                            </a:rPr>
+                            <m:t>=1</m:t>
+                          </m:r>
+                        </m:sub>
+                        <m:sup>
+                          <m:r>
+                            <a:rPr lang="en-US" sz="4000" b="0" i="1" smtClean="0">
+                              <a:latin typeface="Cambria Math" panose="02040503050406030204" pitchFamily="18" charset="0"/>
+                            </a:rPr>
+                            <m:t>42</m:t>
+                          </m:r>
+                        </m:sup>
+                        <m:e>
+                          <m:sSup>
+                            <m:sSupPr>
+                              <m:ctrlPr>
+                                <a:rPr lang="en-US" sz="4000" b="0" i="1" smtClean="0">
+                                  <a:latin typeface="Cambria Math" panose="02040503050406030204" pitchFamily="18" charset="0"/>
+                                </a:rPr>
+                              </m:ctrlPr>
+                            </m:sSupPr>
+                            <m:e>
+                              <m:r>
+                                <a:rPr lang="en-US" sz="4000" b="0" i="1" smtClean="0">
+                                  <a:latin typeface="Cambria Math" panose="02040503050406030204" pitchFamily="18" charset="0"/>
+                                </a:rPr>
+                                <m:t>𝑖</m:t>
+                              </m:r>
+                            </m:e>
+                            <m:sup>
+                              <m:r>
+                                <a:rPr lang="en-US" sz="4000" b="0" i="1" smtClean="0">
+                                  <a:latin typeface="Cambria Math" panose="02040503050406030204" pitchFamily="18" charset="0"/>
+                                </a:rPr>
+                                <m:t>2</m:t>
+                              </m:r>
+                            </m:sup>
+                          </m:sSup>
+                        </m:e>
+                      </m:nary>
+                    </m:oMath>
+                  </m:oMathPara>
+                </a14:m>
+                <a:endParaRPr lang="en-US" sz="4000" i="1" dirty="0" smtClean="0">
+                  <a:latin typeface="Cambria Math" panose="02040503050406030204" pitchFamily="18" charset="0"/>
+                </a:endParaRPr>
+              </a:p>
+              <a:p>
+                <a:pPr marL="0" indent="0">
+                  <a:buNone/>
+                </a:pPr>
+                <a:endParaRPr lang="en-US" sz="4000" i="1" dirty="0" smtClean="0">
+                  <a:latin typeface="Cambria Math" panose="02040503050406030204" pitchFamily="18" charset="0"/>
+                </a:endParaRPr>
+              </a:p>
+              <a:p>
+                <a:pPr marL="0" indent="0">
+                  <a:buNone/>
+                </a:pPr>
+                <a:endParaRPr lang="en-US" sz="4000" i="1" dirty="0" smtClean="0">
+                  <a:latin typeface="Cambria Math" panose="02040503050406030204" pitchFamily="18" charset="0"/>
+                </a:endParaRPr>
+              </a:p>
+              <a:p>
+                <a:pPr marL="0" indent="0">
+                  <a:buNone/>
+                </a:pPr>
+                <a:r>
+                  <a:rPr lang="en-US" sz="4000" i="1" dirty="0" smtClean="0">
+                    <a:latin typeface="Cambria Math" panose="02040503050406030204" pitchFamily="18" charset="0"/>
+                  </a:rPr>
+                  <a:t>Evaluate the following as n approaches infinity.</a:t>
+                </a:r>
+              </a:p>
+              <a:p>
+                <a:pPr marL="0" indent="0">
+                  <a:buNone/>
+                </a:pPr>
+                <a14:m>
+                  <m:oMathPara xmlns:m="http://schemas.openxmlformats.org/officeDocument/2006/math">
+                    <m:oMathParaPr>
+                      <m:jc m:val="left"/>
+                    </m:oMathParaPr>
+                    <m:oMath xmlns:m="http://schemas.openxmlformats.org/officeDocument/2006/math">
+                      <m:nary>
+                        <m:naryPr>
+                          <m:chr m:val="∑"/>
+                          <m:ctrlPr>
+                            <a:rPr lang="en-US" sz="4000" i="1" smtClean="0">
+                              <a:latin typeface="Cambria Math" panose="02040503050406030204" pitchFamily="18" charset="0"/>
+                            </a:rPr>
+                          </m:ctrlPr>
+                        </m:naryPr>
+                        <m:sub>
+                          <m:r>
+                            <m:rPr>
+                              <m:brk m:alnAt="23"/>
+                            </m:rPr>
+                            <a:rPr lang="en-US" sz="4000" i="1">
+                              <a:latin typeface="Cambria Math" panose="02040503050406030204" pitchFamily="18" charset="0"/>
+                            </a:rPr>
+                            <m:t>𝑖</m:t>
+                          </m:r>
+                          <m:r>
+                            <a:rPr lang="en-US" sz="4000" i="1">
+                              <a:latin typeface="Cambria Math" panose="02040503050406030204" pitchFamily="18" charset="0"/>
+                            </a:rPr>
+                            <m:t>=1</m:t>
+                          </m:r>
+                        </m:sub>
+                        <m:sup>
+                          <m:r>
+                            <a:rPr lang="en-US" sz="4000" i="1">
+                              <a:latin typeface="Cambria Math" panose="02040503050406030204" pitchFamily="18" charset="0"/>
+                            </a:rPr>
+                            <m:t>𝑛</m:t>
+                          </m:r>
+                        </m:sup>
+                        <m:e>
+                          <m:f>
+                            <m:fPr>
+                              <m:ctrlPr>
+                                <a:rPr lang="en-US" sz="4000" i="1">
+                                  <a:latin typeface="Cambria Math" panose="02040503050406030204" pitchFamily="18" charset="0"/>
+                                </a:rPr>
+                              </m:ctrlPr>
+                            </m:fPr>
+                            <m:num>
+                              <m:r>
+                                <a:rPr lang="en-US" sz="4000" i="1">
+                                  <a:latin typeface="Cambria Math" panose="02040503050406030204" pitchFamily="18" charset="0"/>
+                                </a:rPr>
+                                <m:t>𝑖</m:t>
+                              </m:r>
+                              <m:r>
+                                <a:rPr lang="en-US" sz="4000" b="0" i="1" smtClean="0">
+                                  <a:latin typeface="Cambria Math" panose="02040503050406030204" pitchFamily="18" charset="0"/>
+                                </a:rPr>
+                                <m:t>−6</m:t>
+                              </m:r>
+                            </m:num>
+                            <m:den>
+                              <m:sSup>
+                                <m:sSupPr>
+                                  <m:ctrlPr>
+                                    <a:rPr lang="en-US" sz="4000" i="1">
+                                      <a:latin typeface="Cambria Math" panose="02040503050406030204" pitchFamily="18" charset="0"/>
+                                    </a:rPr>
+                                  </m:ctrlPr>
+                                </m:sSupPr>
+                                <m:e>
+                                  <m:r>
+                                    <a:rPr lang="en-US" sz="4000" b="0" i="1" smtClean="0">
+                                      <a:latin typeface="Cambria Math" panose="02040503050406030204" pitchFamily="18" charset="0"/>
+                                    </a:rPr>
+                                    <m:t>𝑛</m:t>
+                                  </m:r>
+                                </m:e>
+                                <m:sup>
+                                  <m:r>
+                                    <a:rPr lang="en-US" sz="4000" i="1">
+                                      <a:latin typeface="Cambria Math" panose="02040503050406030204" pitchFamily="18" charset="0"/>
+                                    </a:rPr>
+                                    <m:t>2</m:t>
+                                  </m:r>
+                                </m:sup>
+                              </m:sSup>
+                            </m:den>
+                          </m:f>
+                        </m:e>
+                      </m:nary>
+                    </m:oMath>
+                  </m:oMathPara>
+                </a14:m>
+                <a:endParaRPr lang="en-US" sz="4000" dirty="0"/>
+              </a:p>
+            </p:txBody>
+          </p:sp>
+        </mc:Choice>
+        <mc:Fallback>
+          <p:sp>
+            <p:nvSpPr>
+              <p:cNvPr id="3" name="Content Placeholder 2"/>
+              <p:cNvSpPr>
+                <a:spLocks noGrp="1" noRot="1" noChangeAspect="1" noMove="1" noResize="1" noEditPoints="1" noAdjustHandles="1" noChangeArrowheads="1" noChangeShapeType="1" noTextEdit="1"/>
+              </p:cNvSpPr>
+              <p:nvPr>
+                <p:ph idx="1"/>
+              </p:nvPr>
+            </p:nvSpPr>
+            <p:spPr>
+              <a:xfrm>
+                <a:off x="1371600" y="1436914"/>
+                <a:ext cx="9601200" cy="5297714"/>
+              </a:xfrm>
+              <a:blipFill rotWithShape="0">
+                <a:blip r:embed="rId2"/>
+                <a:stretch>
+                  <a:fillRect l="-1968" t="-4603" r="-1524"/>
+                </a:stretch>
+              </a:blipFill>
+            </p:spPr>
+            <p:txBody>
+              <a:bodyPr/>
+              <a:lstStyle/>
+              <a:p>
+                <a:r>
+                  <a:rPr lang="en-US">
+                    <a:noFill/>
+                  </a:rPr>
+                  <a:t> </a:t>
+                </a:r>
+              </a:p>
+            </p:txBody>
+          </p:sp>
+        </mc:Fallback>
+      </mc:AlternateContent>
+    </p:spTree>
+    <p:extLst>
+      <p:ext uri="{BB962C8B-B14F-4D97-AF65-F5344CB8AC3E}">
+        <p14:creationId xmlns:p14="http://schemas.microsoft.com/office/powerpoint/2010/main" val="3442378732"/>
+      </p:ext>
+    </p:extLst>
+  </p:cSld>
+  <p:clrMapOvr>
+    <a:masterClrMapping/>
+  </p:clrMapOvr>
+  <p:timing>
+    <p:tnLst>
+      <p:par>
+        <p:cTn id="1" dur="indefinite" restart="never" nodeType="tmRoot"/>
+      </p:par>
+    </p:tnLst>
+  </p:timing>
+</p:sld>
+</file>
+
+<file path=ppt/slides/slide3.xml><?xml version="1.0" encoding="utf-8"?>
+<p:sld xmlns:a="http://schemas.openxmlformats.org/drawingml/2006/main" xmlns:r="http://schemas.openxmlformats.org/officeDocument/2006/relationships" xmlns:p="http://schemas.openxmlformats.org/presentationml/2006/main">
+  <p:cSld>
+    <p:spTree>
+      <p:nvGrpSpPr>
+        <p:cNvPr id="1" name=""/>
+        <p:cNvGrpSpPr/>
+        <p:nvPr/>
+      </p:nvGrpSpPr>
+      <p:grpSpPr>
+        <a:xfrm>
+          <a:off x="0" y="0"/>
+          <a:ext cx="0" cy="0"/>
+          <a:chOff x="0" y="0"/>
+          <a:chExt cx="0" cy="0"/>
+        </a:xfrm>
+      </p:grpSpPr>
+      <p:sp>
+        <p:nvSpPr>
+          <p:cNvPr id="2" name="Title 1"/>
+          <p:cNvSpPr>
+            <a:spLocks noGrp="1"/>
+          </p:cNvSpPr>
+          <p:nvPr>
+            <p:ph type="title"/>
+          </p:nvPr>
+        </p:nvSpPr>
+        <p:spPr/>
+        <p:txBody>
+          <a:bodyPr/>
+          <a:lstStyle/>
+          <a:p>
+            <a:r>
+              <a:rPr lang="en-US" dirty="0" smtClean="0"/>
+              <a:t>For Last Time... </a:t>
+            </a:r>
+            <a:endParaRPr lang="en-US" dirty="0"/>
+          </a:p>
+        </p:txBody>
+      </p:sp>
+      <mc:AlternateContent xmlns:mc="http://schemas.openxmlformats.org/markup-compatibility/2006" xmlns:a14="http://schemas.microsoft.com/office/drawing/2010/main">
+        <mc:Choice Requires="a14">
           <p:sp>
             <p:nvSpPr>
               <p:cNvPr id="3" name="Content Placeholder 2"/>
@@ -4006,7 +4338,7 @@
             </p:txBody>
           </p:sp>
         </mc:Choice>
-        <mc:Fallback>
+        <mc:Fallback xmlns="">
           <p:sp>
             <p:nvSpPr>
               <p:cNvPr id="3" name="Content Placeholder 2"/>
@@ -4054,141 +4386,13 @@
   <p:clrMapOvr>
     <a:masterClrMapping/>
   </p:clrMapOvr>
-</p:sld>
-</file>
-
-<file path=ppt/slides/slide3.xml><?xml version="1.0" encoding="utf-8"?>
-<p:sld xmlns:a="http://schemas.openxmlformats.org/drawingml/2006/main" xmlns:r="http://schemas.openxmlformats.org/officeDocument/2006/relationships" xmlns:p="http://schemas.openxmlformats.org/presentationml/2006/main">
-  <p:cSld>
-    <p:spTree>
-      <p:nvGrpSpPr>
-        <p:cNvPr id="1" name=""/>
-        <p:cNvGrpSpPr/>
-        <p:nvPr/>
-      </p:nvGrpSpPr>
-      <p:grpSpPr>
-        <a:xfrm>
-          <a:off x="0" y="0"/>
-          <a:ext cx="0" cy="0"/>
-          <a:chOff x="0" y="0"/>
-          <a:chExt cx="0" cy="0"/>
-        </a:xfrm>
-      </p:grpSpPr>
-      <p:sp>
-        <p:nvSpPr>
-          <p:cNvPr id="2" name="Title 1"/>
-          <p:cNvSpPr>
-            <a:spLocks noGrp="1"/>
-          </p:cNvSpPr>
-          <p:nvPr>
-            <p:ph type="title"/>
-          </p:nvPr>
-        </p:nvSpPr>
-        <p:spPr>
-          <a:xfrm>
-            <a:off x="936885" y="860997"/>
-            <a:ext cx="9601200" cy="1485900"/>
-          </a:xfrm>
-        </p:spPr>
-        <p:txBody>
-          <a:bodyPr/>
-          <a:lstStyle/>
-          <a:p>
-            <a:r>
-              <a:rPr lang="en-US" dirty="0" smtClean="0"/>
-              <a:t>Things to Study for the Test	</a:t>
-            </a:r>
-            <a:endParaRPr lang="en-US" dirty="0"/>
-          </a:p>
-        </p:txBody>
-      </p:sp>
-      <p:sp>
-        <p:nvSpPr>
-          <p:cNvPr id="3" name="Content Placeholder 2"/>
-          <p:cNvSpPr>
-            <a:spLocks noGrp="1"/>
-          </p:cNvSpPr>
-          <p:nvPr>
-            <p:ph idx="1"/>
-          </p:nvPr>
-        </p:nvSpPr>
-        <p:spPr>
-          <a:xfrm>
-            <a:off x="936885" y="1603947"/>
-            <a:ext cx="10820400" cy="4563256"/>
-          </a:xfrm>
-        </p:spPr>
-        <p:txBody>
-          <a:bodyPr>
-            <a:noAutofit/>
-          </a:bodyPr>
-          <a:lstStyle/>
-          <a:p>
-            <a:r>
-              <a:rPr lang="en-US" sz="3000" dirty="0" smtClean="0"/>
-              <a:t>Evaluate limit as x approaches a constant </a:t>
-            </a:r>
-          </a:p>
-          <a:p>
-            <a:pPr lvl="1"/>
-            <a:r>
-              <a:rPr lang="en-US" sz="3000" dirty="0"/>
-              <a:t>D</a:t>
-            </a:r>
-            <a:r>
-              <a:rPr lang="en-US" sz="3000" dirty="0" smtClean="0"/>
-              <a:t>oes it exist, left and right, what is it?</a:t>
-            </a:r>
-          </a:p>
-          <a:p>
-            <a:r>
-              <a:rPr lang="en-US" sz="3000" dirty="0" smtClean="0"/>
-              <a:t>Find derivative of a cubic</a:t>
-            </a:r>
-          </a:p>
-          <a:p>
-            <a:r>
-              <a:rPr lang="en-US" sz="3000" dirty="0" smtClean="0"/>
-              <a:t>Find derivative of a quadratic</a:t>
-            </a:r>
-          </a:p>
-          <a:p>
-            <a:pPr lvl="1"/>
-            <a:r>
-              <a:rPr lang="en-US" sz="3000" dirty="0" smtClean="0"/>
-              <a:t>Both methods (with and without ‘h’)</a:t>
-            </a:r>
-          </a:p>
-          <a:p>
-            <a:r>
-              <a:rPr lang="en-US" sz="3000" dirty="0" smtClean="0"/>
-              <a:t>Write the equation of a line tangent to f(x) through a given point</a:t>
-            </a:r>
-          </a:p>
-          <a:p>
-            <a:r>
-              <a:rPr lang="en-US" sz="3000" dirty="0" smtClean="0"/>
-              <a:t>Evaluate limit as x approaches infinity</a:t>
-            </a:r>
-          </a:p>
-          <a:p>
-            <a:r>
-              <a:rPr lang="en-US" sz="3000" dirty="0" smtClean="0"/>
-              <a:t>Evaluate summation </a:t>
-            </a:r>
-          </a:p>
-        </p:txBody>
-      </p:sp>
-    </p:spTree>
-    <p:extLst>
-      <p:ext uri="{BB962C8B-B14F-4D97-AF65-F5344CB8AC3E}">
-        <p14:creationId xmlns:p14="http://schemas.microsoft.com/office/powerpoint/2010/main" val="3801665224"/>
-      </p:ext>
-    </p:extLst>
-  </p:cSld>
-  <p:clrMapOvr>
-    <a:masterClrMapping/>
-  </p:clrMapOvr>
+  <p:timing>
+    <p:tnLst>
+      <p:par>
+        <p:cTn id="1" dur="indefinite" restart="never" nodeType="tmRoot"/>
+      </p:par>
+    </p:tnLst>
+  </p:timing>
 </p:sld>
 </file>
 
@@ -4211,6 +4415,148 @@
       </p:grpSpPr>
       <p:sp>
         <p:nvSpPr>
+          <p:cNvPr id="2" name="Title 1"/>
+          <p:cNvSpPr>
+            <a:spLocks noGrp="1"/>
+          </p:cNvSpPr>
+          <p:nvPr>
+            <p:ph type="title"/>
+          </p:nvPr>
+        </p:nvSpPr>
+        <p:spPr>
+          <a:xfrm>
+            <a:off x="936885" y="860997"/>
+            <a:ext cx="9601200" cy="1485900"/>
+          </a:xfrm>
+        </p:spPr>
+        <p:txBody>
+          <a:bodyPr/>
+          <a:lstStyle/>
+          <a:p>
+            <a:r>
+              <a:rPr lang="en-US" dirty="0" smtClean="0"/>
+              <a:t>Things to Study for the Test	</a:t>
+            </a:r>
+            <a:endParaRPr lang="en-US" dirty="0"/>
+          </a:p>
+        </p:txBody>
+      </p:sp>
+      <p:sp>
+        <p:nvSpPr>
+          <p:cNvPr id="3" name="Content Placeholder 2"/>
+          <p:cNvSpPr>
+            <a:spLocks noGrp="1"/>
+          </p:cNvSpPr>
+          <p:nvPr>
+            <p:ph idx="1"/>
+          </p:nvPr>
+        </p:nvSpPr>
+        <p:spPr>
+          <a:xfrm>
+            <a:off x="936885" y="1603947"/>
+            <a:ext cx="10820400" cy="4563256"/>
+          </a:xfrm>
+        </p:spPr>
+        <p:txBody>
+          <a:bodyPr>
+            <a:noAutofit/>
+          </a:bodyPr>
+          <a:lstStyle/>
+          <a:p>
+            <a:r>
+              <a:rPr lang="en-US" sz="3000" dirty="0" smtClean="0"/>
+              <a:t>Evaluate limit as x approaches a constant </a:t>
+            </a:r>
+          </a:p>
+          <a:p>
+            <a:pPr lvl="1"/>
+            <a:r>
+              <a:rPr lang="en-US" sz="3000" dirty="0"/>
+              <a:t>D</a:t>
+            </a:r>
+            <a:r>
+              <a:rPr lang="en-US" sz="3000" dirty="0" smtClean="0"/>
+              <a:t>oes it exist, left and right, what is it?</a:t>
+            </a:r>
+          </a:p>
+          <a:p>
+            <a:r>
+              <a:rPr lang="en-US" sz="3000" dirty="0" smtClean="0"/>
+              <a:t>Find derivative of a cubic</a:t>
+            </a:r>
+          </a:p>
+          <a:p>
+            <a:r>
+              <a:rPr lang="en-US" sz="3000" dirty="0" smtClean="0"/>
+              <a:t>Find derivative of a quadratic</a:t>
+            </a:r>
+          </a:p>
+          <a:p>
+            <a:pPr lvl="1"/>
+            <a:r>
+              <a:rPr lang="en-US" sz="3000" dirty="0" smtClean="0"/>
+              <a:t>Both methods (with and without ‘h’)</a:t>
+            </a:r>
+          </a:p>
+          <a:p>
+            <a:r>
+              <a:rPr lang="en-US" sz="3000" dirty="0" smtClean="0"/>
+              <a:t>Write the equation of a line tangent to f(x) through a given point</a:t>
+            </a:r>
+          </a:p>
+          <a:p>
+            <a:r>
+              <a:rPr lang="en-US" sz="3000" dirty="0" smtClean="0"/>
+              <a:t>Evaluate limit as x approaches infinity</a:t>
+            </a:r>
+          </a:p>
+          <a:p>
+            <a:r>
+              <a:rPr lang="en-US" sz="3000" dirty="0" smtClean="0"/>
+              <a:t>Evaluate summation </a:t>
+            </a:r>
+          </a:p>
+        </p:txBody>
+      </p:sp>
+    </p:spTree>
+    <p:extLst>
+      <p:ext uri="{BB962C8B-B14F-4D97-AF65-F5344CB8AC3E}">
+        <p14:creationId xmlns:p14="http://schemas.microsoft.com/office/powerpoint/2010/main" val="3801665224"/>
+      </p:ext>
+    </p:extLst>
+  </p:cSld>
+  <p:clrMapOvr>
+    <a:masterClrMapping/>
+  </p:clrMapOvr>
+  <p:timing>
+    <p:tnLst>
+      <p:par>
+        <p:cTn id="1" dur="indefinite" restart="never" nodeType="tmRoot"/>
+      </p:par>
+    </p:tnLst>
+  </p:timing>
+</p:sld>
+</file>
+
+<file path=ppt/slides/slide5.xml><?xml version="1.0" encoding="utf-8"?>
+<p:sld xmlns:a="http://schemas.openxmlformats.org/drawingml/2006/main" xmlns:r="http://schemas.openxmlformats.org/officeDocument/2006/relationships" xmlns:p="http://schemas.openxmlformats.org/presentationml/2006/main">
+  <p:cSld>
+    <p:spTree>
+      <p:nvGrpSpPr>
+        <p:cNvPr id="1" name=""/>
+        <p:cNvGrpSpPr/>
+        <p:nvPr/>
+      </p:nvGrpSpPr>
+      <p:grpSpPr>
+        <a:xfrm>
+          <a:off x="0" y="0"/>
+          <a:ext cx="0" cy="0"/>
+          <a:chOff x="0" y="0"/>
+          <a:chExt cx="0" cy="0"/>
+        </a:xfrm>
+      </p:grpSpPr>
+      <p:sp>
+        <p:nvSpPr>
           <p:cNvPr id="3" name="Content Placeholder 2"/>
           <p:cNvSpPr>
             <a:spLocks noGrp="1"/>
@@ -4373,6 +4719,13 @@
   <p:clrMapOvr>
     <a:masterClrMapping/>
   </p:clrMapOvr>
+  <p:timing>
+    <p:tnLst>
+      <p:par>
+        <p:cTn id="1" dur="indefinite" restart="never" nodeType="tmRoot"/>
+      </p:par>
+    </p:tnLst>
+  </p:timing>
 </p:sld>
 </file>
 

</xml_diff>